<commit_message>
Mod7  -Design comparação de sites
</commit_message>
<xml_diff>
--- a/Module07-Design/Aula02/Aula02-comparação-sites.pptx
+++ b/Module07-Design/Aula02/Aula02-comparação-sites.pptx
@@ -265,7 +265,7 @@
           <a:p>
             <a:fld id="{88D371E4-0CFF-4188-8CFA-5EBB6E6DC511}" type="datetimeFigureOut">
               <a:rPr lang="pt-BR" smtClean="0"/>
-              <a:t>09/11/2022</a:t>
+              <a:t>10/11/2022</a:t>
             </a:fld>
             <a:endParaRPr lang="pt-BR"/>
           </a:p>
@@ -476,7 +476,7 @@
           <a:p>
             <a:fld id="{88D371E4-0CFF-4188-8CFA-5EBB6E6DC511}" type="datetimeFigureOut">
               <a:rPr lang="pt-BR" smtClean="0"/>
-              <a:t>09/11/2022</a:t>
+              <a:t>10/11/2022</a:t>
             </a:fld>
             <a:endParaRPr lang="pt-BR"/>
           </a:p>
@@ -691,7 +691,7 @@
           <a:p>
             <a:fld id="{88D371E4-0CFF-4188-8CFA-5EBB6E6DC511}" type="datetimeFigureOut">
               <a:rPr lang="pt-BR" smtClean="0"/>
-              <a:t>09/11/2022</a:t>
+              <a:t>10/11/2022</a:t>
             </a:fld>
             <a:endParaRPr lang="pt-BR"/>
           </a:p>
@@ -892,7 +892,7 @@
           <a:p>
             <a:fld id="{88D371E4-0CFF-4188-8CFA-5EBB6E6DC511}" type="datetimeFigureOut">
               <a:rPr lang="pt-BR" smtClean="0"/>
-              <a:t>09/11/2022</a:t>
+              <a:t>10/11/2022</a:t>
             </a:fld>
             <a:endParaRPr lang="pt-BR"/>
           </a:p>
@@ -1171,7 +1171,7 @@
           <a:p>
             <a:fld id="{88D371E4-0CFF-4188-8CFA-5EBB6E6DC511}" type="datetimeFigureOut">
               <a:rPr lang="pt-BR" smtClean="0"/>
-              <a:t>09/11/2022</a:t>
+              <a:t>10/11/2022</a:t>
             </a:fld>
             <a:endParaRPr lang="pt-BR"/>
           </a:p>
@@ -1439,7 +1439,7 @@
           <a:p>
             <a:fld id="{88D371E4-0CFF-4188-8CFA-5EBB6E6DC511}" type="datetimeFigureOut">
               <a:rPr lang="pt-BR" smtClean="0"/>
-              <a:t>09/11/2022</a:t>
+              <a:t>10/11/2022</a:t>
             </a:fld>
             <a:endParaRPr lang="pt-BR"/>
           </a:p>
@@ -1855,7 +1855,7 @@
           <a:p>
             <a:fld id="{88D371E4-0CFF-4188-8CFA-5EBB6E6DC511}" type="datetimeFigureOut">
               <a:rPr lang="pt-BR" smtClean="0"/>
-              <a:t>09/11/2022</a:t>
+              <a:t>10/11/2022</a:t>
             </a:fld>
             <a:endParaRPr lang="pt-BR"/>
           </a:p>
@@ -2004,7 +2004,7 @@
           <a:p>
             <a:fld id="{88D371E4-0CFF-4188-8CFA-5EBB6E6DC511}" type="datetimeFigureOut">
               <a:rPr lang="pt-BR" smtClean="0"/>
-              <a:t>09/11/2022</a:t>
+              <a:t>10/11/2022</a:t>
             </a:fld>
             <a:endParaRPr lang="pt-BR"/>
           </a:p>
@@ -2130,7 +2130,7 @@
           <a:p>
             <a:fld id="{88D371E4-0CFF-4188-8CFA-5EBB6E6DC511}" type="datetimeFigureOut">
               <a:rPr lang="pt-BR" smtClean="0"/>
-              <a:t>09/11/2022</a:t>
+              <a:t>10/11/2022</a:t>
             </a:fld>
             <a:endParaRPr lang="pt-BR"/>
           </a:p>
@@ -2381,7 +2381,7 @@
           <a:p>
             <a:fld id="{88D371E4-0CFF-4188-8CFA-5EBB6E6DC511}" type="datetimeFigureOut">
               <a:rPr lang="pt-BR" smtClean="0"/>
-              <a:t>09/11/2022</a:t>
+              <a:t>10/11/2022</a:t>
             </a:fld>
             <a:endParaRPr lang="pt-BR"/>
           </a:p>
@@ -2826,7 +2826,7 @@
           <a:p>
             <a:fld id="{88D371E4-0CFF-4188-8CFA-5EBB6E6DC511}" type="datetimeFigureOut">
               <a:rPr lang="pt-BR" smtClean="0"/>
-              <a:t>09/11/2022</a:t>
+              <a:t>10/11/2022</a:t>
             </a:fld>
             <a:endParaRPr lang="pt-BR"/>
           </a:p>
@@ -3152,7 +3152,7 @@
           <a:p>
             <a:fld id="{88D371E4-0CFF-4188-8CFA-5EBB6E6DC511}" type="datetimeFigureOut">
               <a:rPr lang="pt-BR" smtClean="0"/>
-              <a:t>09/11/2022</a:t>
+              <a:t>10/11/2022</a:t>
             </a:fld>
             <a:endParaRPr lang="pt-BR"/>
           </a:p>
@@ -4486,7 +4486,7 @@
         <p:spPr/>
         <p:txBody>
           <a:bodyPr>
-            <a:normAutofit fontScale="85000" lnSpcReduction="10000"/>
+            <a:normAutofit fontScale="92500" lnSpcReduction="10000"/>
           </a:bodyPr>
           <a:lstStyle/>
           <a:p>
@@ -4566,20 +4566,7 @@
           <a:p>
             <a:r>
               <a:rPr lang="pt-BR" dirty="0"/>
-              <a:t>Você notou que em todos os critérios acima a parte estética não foi levada em conta diretamente?</a:t>
-            </a:r>
-          </a:p>
-          <a:p>
-            <a:r>
-              <a:rPr lang="pt-BR" dirty="0"/>
-              <a:t>Eficaz: fazer as coisas certas (macro).</a:t>
-            </a:r>
-            <a:br>
-              <a:rPr lang="pt-BR" dirty="0"/>
-            </a:br>
-            <a:r>
-              <a:rPr lang="pt-BR" dirty="0"/>
-              <a:t>Eficiente: fazer certo as coisas (micro).</a:t>
+              <a:t>Eficaz: fazer as coisas certas (macro). Eficiente: fazer certo as coisas (micro).</a:t>
             </a:r>
           </a:p>
           <a:p>
@@ -5177,7 +5164,7 @@
         </p:blipFill>
         <p:spPr>
           <a:xfrm>
-            <a:off x="2560320" y="2843165"/>
+            <a:off x="2447778" y="2646218"/>
             <a:ext cx="7990449" cy="3835652"/>
           </a:xfrm>
           <a:prstGeom prst="rect">

</xml_diff>